<commit_message>
Arquivo de Apresentação referente a issue #20
</commit_message>
<xml_diff>
--- a/Apresentação/SALES TECH.pptx
+++ b/Apresentação/SALES TECH.pptx
@@ -16,8 +16,8 @@
     <p:sldId id="264" r:id="rId10"/>
     <p:sldId id="265" r:id="rId11"/>
     <p:sldId id="260" r:id="rId12"/>
-    <p:sldId id="266" r:id="rId13"/>
-    <p:sldId id="268" r:id="rId14"/>
+    <p:sldId id="268" r:id="rId13"/>
+    <p:sldId id="266" r:id="rId14"/>
     <p:sldId id="267" r:id="rId15"/>
   </p:sldIdLst>
   <p:sldSz cx="12192000" cy="6858000"/>
@@ -117,13 +117,18 @@
       </a:defRPr>
     </a:lvl9pPr>
   </p:defaultTextStyle>
+  <p:extLst>
+    <p:ext uri="{EFAFB233-063F-42B5-8137-9DF3F51BA10A}">
+      <p15:sldGuideLst xmlns:p15="http://schemas.microsoft.com/office/powerpoint/2012/main"/>
+    </p:ext>
+  </p:extLst>
 </p:presentation>
 </file>
 
 <file path=ppt/revisionInfo.xml><?xml version="1.0" encoding="utf-8"?>
 <p1510:revInfo xmlns:a="http://schemas.openxmlformats.org/drawingml/2006/main" xmlns:r="http://schemas.openxmlformats.org/officeDocument/2006/relationships" xmlns:p1510="http://schemas.microsoft.com/office/powerpoint/2015/10/main">
   <p1510:revLst>
-    <p1510:client id="{EE69C8B5-B34B-4963-B2B8-A9527995FA9D}" v="21" dt="2024-12-17T01:08:17.993"/>
+    <p1510:client id="{EE69C8B5-B34B-4963-B2B8-A9527995FA9D}" v="22" dt="2024-12-17T20:38:07.380"/>
   </p1510:revLst>
 </p1510:revInfo>
 </file>
@@ -133,7 +138,7 @@
   <pc:docChgLst>
     <pc:chgData name="Luan eliseu ferrazzo" userId="69bb020bc42e3808" providerId="LiveId" clId="{EE69C8B5-B34B-4963-B2B8-A9527995FA9D}"/>
     <pc:docChg chg="undo custSel addSld modSld sldOrd">
-      <pc:chgData name="Luan eliseu ferrazzo" userId="69bb020bc42e3808" providerId="LiveId" clId="{EE69C8B5-B34B-4963-B2B8-A9527995FA9D}" dt="2024-12-17T01:14:01.558" v="667" actId="27636"/>
+      <pc:chgData name="Luan eliseu ferrazzo" userId="69bb020bc42e3808" providerId="LiveId" clId="{EE69C8B5-B34B-4963-B2B8-A9527995FA9D}" dt="2024-12-17T20:38:41.955" v="715" actId="1076"/>
       <pc:docMkLst>
         <pc:docMk/>
       </pc:docMkLst>
@@ -255,8 +260,8 @@
           </ac:spMkLst>
         </pc:spChg>
       </pc:sldChg>
-      <pc:sldChg chg="modSp">
-        <pc:chgData name="Luan eliseu ferrazzo" userId="69bb020bc42e3808" providerId="LiveId" clId="{EE69C8B5-B34B-4963-B2B8-A9527995FA9D}" dt="2024-12-17T00:45:20.118" v="442"/>
+      <pc:sldChg chg="addSp delSp modSp mod">
+        <pc:chgData name="Luan eliseu ferrazzo" userId="69bb020bc42e3808" providerId="LiveId" clId="{EE69C8B5-B34B-4963-B2B8-A9527995FA9D}" dt="2024-12-17T20:38:41.955" v="715" actId="1076"/>
         <pc:sldMkLst>
           <pc:docMk/>
           <pc:sldMk cId="4022710773" sldId="258"/>
@@ -269,6 +274,30 @@
             <ac:spMk id="2" creationId="{6DB32292-C623-EEAB-F99A-1A318F82B6CE}"/>
           </ac:spMkLst>
         </pc:spChg>
+        <pc:spChg chg="add mod">
+          <ac:chgData name="Luan eliseu ferrazzo" userId="69bb020bc42e3808" providerId="LiveId" clId="{EE69C8B5-B34B-4963-B2B8-A9527995FA9D}" dt="2024-12-17T20:27:49.502" v="678" actId="1035"/>
+          <ac:spMkLst>
+            <pc:docMk/>
+            <pc:sldMk cId="4022710773" sldId="258"/>
+            <ac:spMk id="3" creationId="{0B858A44-4803-5B3E-D98F-0BEA9DC48CEB}"/>
+          </ac:spMkLst>
+        </pc:spChg>
+        <pc:picChg chg="del">
+          <ac:chgData name="Luan eliseu ferrazzo" userId="69bb020bc42e3808" providerId="LiveId" clId="{EE69C8B5-B34B-4963-B2B8-A9527995FA9D}" dt="2024-12-17T20:38:04.965" v="703" actId="478"/>
+          <ac:picMkLst>
+            <pc:docMk/>
+            <pc:sldMk cId="4022710773" sldId="258"/>
+            <ac:picMk id="5" creationId="{B35FA7AB-24C3-4CD2-8221-7A93394BBD11}"/>
+          </ac:picMkLst>
+        </pc:picChg>
+        <pc:picChg chg="add del mod ord">
+          <ac:chgData name="Luan eliseu ferrazzo" userId="69bb020bc42e3808" providerId="LiveId" clId="{EE69C8B5-B34B-4963-B2B8-A9527995FA9D}" dt="2024-12-17T20:38:41.955" v="715" actId="1076"/>
+          <ac:picMkLst>
+            <pc:docMk/>
+            <pc:sldMk cId="4022710773" sldId="258"/>
+            <ac:picMk id="6" creationId="{E7700CA5-1FF9-227E-B4F4-750C5B9E14E4}"/>
+          </ac:picMkLst>
+        </pc:picChg>
       </pc:sldChg>
       <pc:sldChg chg="addSp delSp modSp mod">
         <pc:chgData name="Luan eliseu ferrazzo" userId="69bb020bc42e3808" providerId="LiveId" clId="{EE69C8B5-B34B-4963-B2B8-A9527995FA9D}" dt="2024-12-17T00:39:57.713" v="384" actId="113"/>
@@ -390,7 +419,7 @@
         </pc:picChg>
       </pc:sldChg>
       <pc:sldChg chg="addSp delSp modSp mod setBg">
-        <pc:chgData name="Luan eliseu ferrazzo" userId="69bb020bc42e3808" providerId="LiveId" clId="{EE69C8B5-B34B-4963-B2B8-A9527995FA9D}" dt="2024-12-17T00:45:35.695" v="444"/>
+        <pc:chgData name="Luan eliseu ferrazzo" userId="69bb020bc42e3808" providerId="LiveId" clId="{EE69C8B5-B34B-4963-B2B8-A9527995FA9D}" dt="2024-12-17T20:26:52.666" v="670" actId="20577"/>
         <pc:sldMkLst>
           <pc:docMk/>
           <pc:sldMk cId="2176833026" sldId="260"/>
@@ -460,7 +489,7 @@
           </ac:spMkLst>
         </pc:spChg>
         <pc:spChg chg="add mod">
-          <ac:chgData name="Luan eliseu ferrazzo" userId="69bb020bc42e3808" providerId="LiveId" clId="{EE69C8B5-B34B-4963-B2B8-A9527995FA9D}" dt="2024-12-17T00:38:15.433" v="328" actId="255"/>
+          <ac:chgData name="Luan eliseu ferrazzo" userId="69bb020bc42e3808" providerId="LiveId" clId="{EE69C8B5-B34B-4963-B2B8-A9527995FA9D}" dt="2024-12-17T20:26:52.666" v="670" actId="20577"/>
           <ac:spMkLst>
             <pc:docMk/>
             <pc:sldMk cId="2176833026" sldId="260"/>
@@ -1205,8 +1234,8 @@
           </ac:spMkLst>
         </pc:spChg>
       </pc:sldChg>
-      <pc:sldChg chg="addSp delSp modSp add mod">
-        <pc:chgData name="Luan eliseu ferrazzo" userId="69bb020bc42e3808" providerId="LiveId" clId="{EE69C8B5-B34B-4963-B2B8-A9527995FA9D}" dt="2024-12-17T00:59:57.921" v="519"/>
+      <pc:sldChg chg="addSp delSp modSp add mod ord">
+        <pc:chgData name="Luan eliseu ferrazzo" userId="69bb020bc42e3808" providerId="LiveId" clId="{EE69C8B5-B34B-4963-B2B8-A9527995FA9D}" dt="2024-12-17T01:24:20.338" v="669"/>
         <pc:sldMkLst>
           <pc:docMk/>
           <pc:sldMk cId="935743452" sldId="268"/>
@@ -1237,7 +1266,7 @@
         </pc:picChg>
       </pc:sldChg>
       <pc:sldChg chg="addSp delSp modSp add mod ord">
-        <pc:chgData name="Luan eliseu ferrazzo" userId="69bb020bc42e3808" providerId="LiveId" clId="{EE69C8B5-B34B-4963-B2B8-A9527995FA9D}" dt="2024-12-17T01:14:01.558" v="667" actId="27636"/>
+        <pc:chgData name="Luan eliseu ferrazzo" userId="69bb020bc42e3808" providerId="LiveId" clId="{EE69C8B5-B34B-4963-B2B8-A9527995FA9D}" dt="2024-12-17T20:29:33.146" v="702" actId="20577"/>
         <pc:sldMkLst>
           <pc:docMk/>
           <pc:sldMk cId="1659952087" sldId="269"/>
@@ -1251,7 +1280,7 @@
           </ac:spMkLst>
         </pc:spChg>
         <pc:spChg chg="add mod">
-          <ac:chgData name="Luan eliseu ferrazzo" userId="69bb020bc42e3808" providerId="LiveId" clId="{EE69C8B5-B34B-4963-B2B8-A9527995FA9D}" dt="2024-12-17T01:14:01.558" v="667" actId="27636"/>
+          <ac:chgData name="Luan eliseu ferrazzo" userId="69bb020bc42e3808" providerId="LiveId" clId="{EE69C8B5-B34B-4963-B2B8-A9527995FA9D}" dt="2024-12-17T20:29:33.146" v="702" actId="20577"/>
           <ac:spMkLst>
             <pc:docMk/>
             <pc:sldMk cId="1659952087" sldId="269"/>
@@ -5849,17 +5878,6 @@
           <a:p>
             <a:r>
               <a:rPr lang="pt-BR" sz="1900" dirty="0"/>
-              <a:t>Silver: AWS </a:t>
-            </a:r>
-            <a:r>
-              <a:rPr lang="pt-BR" sz="1900" dirty="0" err="1"/>
-              <a:t>Glue</a:t>
-            </a:r>
-            <a:endParaRPr lang="pt-BR" sz="1900" dirty="0"/>
-          </a:p>
-          <a:p>
-            <a:r>
-              <a:rPr lang="pt-BR" sz="1900" dirty="0"/>
               <a:t>Gold: </a:t>
             </a:r>
             <a:r>
@@ -5978,7 +5996,7 @@
         <p:cNvPr id="1" name="">
           <a:extLst>
             <a:ext uri="{FF2B5EF4-FFF2-40B4-BE49-F238E27FC236}">
-              <a16:creationId xmlns:a16="http://schemas.microsoft.com/office/drawing/2014/main" id="{D6802A44-F202-3709-791F-AEAD0923A73A}"/>
+              <a16:creationId xmlns:a16="http://schemas.microsoft.com/office/drawing/2014/main" id="{DE5DB6D0-79CA-C9D6-5D17-7F29D2E89390}"/>
             </a:ext>
           </a:extLst>
         </p:cNvPr>
@@ -5998,7 +6016,7 @@
           <p:cNvPr id="62" name="Rectangle 61">
             <a:extLst>
               <a:ext uri="{FF2B5EF4-FFF2-40B4-BE49-F238E27FC236}">
-                <a16:creationId xmlns:a16="http://schemas.microsoft.com/office/drawing/2014/main" id="{017517EF-BD4D-4055-BDB4-A322C53568AD}"/>
+                <a16:creationId xmlns:a16="http://schemas.microsoft.com/office/drawing/2014/main" id="{2FB61FCF-18EC-BAB8-7AEE-849924DE042A}"/>
               </a:ext>
               <a:ext uri="{C183D7F6-B498-43B3-948B-1728B52AA6E4}">
                 <adec:decorative xmlns:adec="http://schemas.microsoft.com/office/drawing/2017/decorative" val="1"/>
@@ -6058,7 +6076,7 @@
           <p:cNvPr id="64" name="Rectangle 63">
             <a:extLst>
               <a:ext uri="{FF2B5EF4-FFF2-40B4-BE49-F238E27FC236}">
-                <a16:creationId xmlns:a16="http://schemas.microsoft.com/office/drawing/2014/main" id="{0ADDB668-2CA4-4D2B-9C34-3487CA330BA8}"/>
+                <a16:creationId xmlns:a16="http://schemas.microsoft.com/office/drawing/2014/main" id="{24F8C86B-B6F4-4EAB-D27E-2BC5F49684F6}"/>
               </a:ext>
               <a:ext uri="{C183D7F6-B498-43B3-948B-1728B52AA6E4}">
                 <adec:decorative xmlns:adec="http://schemas.microsoft.com/office/drawing/2017/decorative" val="1"/>
@@ -6157,7 +6175,7 @@
           <p:cNvPr id="2" name="Título 1">
             <a:extLst>
               <a:ext uri="{FF2B5EF4-FFF2-40B4-BE49-F238E27FC236}">
-                <a16:creationId xmlns:a16="http://schemas.microsoft.com/office/drawing/2014/main" id="{67781C07-DAE7-3E8D-0792-9B957C526C5D}"/>
+                <a16:creationId xmlns:a16="http://schemas.microsoft.com/office/drawing/2014/main" id="{470439E8-687C-1F82-FCAA-EF5F35DA5FA3}"/>
               </a:ext>
             </a:extLst>
           </p:cNvPr>
@@ -6181,7 +6199,7 @@
           <a:lstStyle/>
           <a:p>
             <a:r>
-              <a:rPr lang="en-US" sz="4000" b="1" kern="1200">
+              <a:rPr lang="en-US" sz="4000" b="1" kern="1200" dirty="0">
                 <a:solidFill>
                   <a:schemeClr val="tx1"/>
                 </a:solidFill>
@@ -6189,7 +6207,7 @@
                 <a:ea typeface="+mj-ea"/>
                 <a:cs typeface="+mj-cs"/>
               </a:rPr>
-              <a:t>DATAVIZ</a:t>
+              <a:t>CUSTOS </a:t>
             </a:r>
           </a:p>
         </p:txBody>
@@ -6199,7 +6217,7 @@
           <p:cNvPr id="66" name="Rectangle 65">
             <a:extLst>
               <a:ext uri="{FF2B5EF4-FFF2-40B4-BE49-F238E27FC236}">
-                <a16:creationId xmlns:a16="http://schemas.microsoft.com/office/drawing/2014/main" id="{2568BC19-F052-4108-93E1-6A3D1DEC072F}"/>
+                <a16:creationId xmlns:a16="http://schemas.microsoft.com/office/drawing/2014/main" id="{4475CCA1-0CF1-13AA-3AED-D83463551D0C}"/>
               </a:ext>
               <a:ext uri="{C183D7F6-B498-43B3-948B-1728B52AA6E4}">
                 <adec:decorative xmlns:adec="http://schemas.microsoft.com/office/drawing/2017/decorative" val="1"/>
@@ -6267,7 +6285,7 @@
           <p:cNvPr id="68" name="Rectangle 67">
             <a:extLst>
               <a:ext uri="{FF2B5EF4-FFF2-40B4-BE49-F238E27FC236}">
-                <a16:creationId xmlns:a16="http://schemas.microsoft.com/office/drawing/2014/main" id="{D5FD337D-4D6B-4C8B-B6F5-121097E09881}"/>
+                <a16:creationId xmlns:a16="http://schemas.microsoft.com/office/drawing/2014/main" id="{E752B858-DA5C-BBD4-66DF-8EFB52DCFE96}"/>
               </a:ext>
               <a:ext uri="{C183D7F6-B498-43B3-948B-1728B52AA6E4}">
                 <adec:decorative xmlns:adec="http://schemas.microsoft.com/office/drawing/2017/decorative" val="1"/>
@@ -6333,10 +6351,10 @@
       </p:sp>
       <p:pic>
         <p:nvPicPr>
-          <p:cNvPr id="10" name="Imagem 9">
-            <a:extLst>
-              <a:ext uri="{FF2B5EF4-FFF2-40B4-BE49-F238E27FC236}">
-                <a16:creationId xmlns:a16="http://schemas.microsoft.com/office/drawing/2014/main" id="{26557A20-BBEA-4F89-F115-713428A2623E}"/>
+          <p:cNvPr id="4" name="Imagem 3">
+            <a:extLst>
+              <a:ext uri="{FF2B5EF4-FFF2-40B4-BE49-F238E27FC236}">
+                <a16:creationId xmlns:a16="http://schemas.microsoft.com/office/drawing/2014/main" id="{B41D4A5F-2959-5BC1-B9D2-20524D3A1EAA}"/>
               </a:ext>
             </a:extLst>
           </p:cNvPr>
@@ -6346,63 +6364,33 @@
           <p:nvPr/>
         </p:nvPicPr>
         <p:blipFill>
-          <a:blip r:embed="rId2"/>
+          <a:blip r:embed="rId2">
+            <a:duotone>
+              <a:schemeClr val="accent4">
+                <a:shade val="45000"/>
+                <a:satMod val="135000"/>
+              </a:schemeClr>
+              <a:prstClr val="white"/>
+            </a:duotone>
+          </a:blip>
           <a:stretch>
             <a:fillRect/>
           </a:stretch>
         </p:blipFill>
         <p:spPr>
           <a:xfrm>
-            <a:off x="1498994" y="2038052"/>
-            <a:ext cx="8856862" cy="4162585"/>
+            <a:off x="740990" y="2718951"/>
+            <a:ext cx="10432647" cy="2856304"/>
           </a:xfrm>
           <a:prstGeom prst="rect">
             <a:avLst/>
           </a:prstGeom>
         </p:spPr>
       </p:pic>
-      <p:sp>
-        <p:nvSpPr>
-          <p:cNvPr id="13" name="CaixaDeTexto 12">
-            <a:extLst>
-              <a:ext uri="{FF2B5EF4-FFF2-40B4-BE49-F238E27FC236}">
-                <a16:creationId xmlns:a16="http://schemas.microsoft.com/office/drawing/2014/main" id="{F149BD79-BC4B-044A-7343-242978A0F667}"/>
-              </a:ext>
-            </a:extLst>
-          </p:cNvPr>
-          <p:cNvSpPr txBox="1"/>
-          <p:nvPr/>
-        </p:nvSpPr>
-        <p:spPr>
-          <a:xfrm>
-            <a:off x="10444700" y="6316538"/>
-            <a:ext cx="6097836" cy="369332"/>
-          </a:xfrm>
-          <a:prstGeom prst="rect">
-            <a:avLst/>
-          </a:prstGeom>
-          <a:noFill/>
-        </p:spPr>
-        <p:txBody>
-          <a:bodyPr wrap="square">
-            <a:spAutoFit/>
-          </a:bodyPr>
-          <a:lstStyle/>
-          <a:p>
-            <a:r>
-              <a:rPr lang="pt-BR" dirty="0">
-                <a:hlinkClick r:id="rId3"/>
-              </a:rPr>
-              <a:t>SALES-TECH</a:t>
-            </a:r>
-            <a:endParaRPr lang="pt-BR" dirty="0"/>
-          </a:p>
-        </p:txBody>
-      </p:sp>
     </p:spTree>
     <p:extLst>
       <p:ext uri="{BB962C8B-B14F-4D97-AF65-F5344CB8AC3E}">
-        <p14:creationId xmlns:p14="http://schemas.microsoft.com/office/powerpoint/2010/main" val="3905939845"/>
+        <p14:creationId xmlns:p14="http://schemas.microsoft.com/office/powerpoint/2010/main" val="935743452"/>
       </p:ext>
     </p:extLst>
   </p:cSld>
@@ -6428,7 +6416,7 @@
         <p:cNvPr id="1" name="">
           <a:extLst>
             <a:ext uri="{FF2B5EF4-FFF2-40B4-BE49-F238E27FC236}">
-              <a16:creationId xmlns:a16="http://schemas.microsoft.com/office/drawing/2014/main" id="{DE5DB6D0-79CA-C9D6-5D17-7F29D2E89390}"/>
+              <a16:creationId xmlns:a16="http://schemas.microsoft.com/office/drawing/2014/main" id="{D6802A44-F202-3709-791F-AEAD0923A73A}"/>
             </a:ext>
           </a:extLst>
         </p:cNvPr>
@@ -6448,7 +6436,7 @@
           <p:cNvPr id="62" name="Rectangle 61">
             <a:extLst>
               <a:ext uri="{FF2B5EF4-FFF2-40B4-BE49-F238E27FC236}">
-                <a16:creationId xmlns:a16="http://schemas.microsoft.com/office/drawing/2014/main" id="{2FB61FCF-18EC-BAB8-7AEE-849924DE042A}"/>
+                <a16:creationId xmlns:a16="http://schemas.microsoft.com/office/drawing/2014/main" id="{017517EF-BD4D-4055-BDB4-A322C53568AD}"/>
               </a:ext>
               <a:ext uri="{C183D7F6-B498-43B3-948B-1728B52AA6E4}">
                 <adec:decorative xmlns:adec="http://schemas.microsoft.com/office/drawing/2017/decorative" val="1"/>
@@ -6508,7 +6496,7 @@
           <p:cNvPr id="64" name="Rectangle 63">
             <a:extLst>
               <a:ext uri="{FF2B5EF4-FFF2-40B4-BE49-F238E27FC236}">
-                <a16:creationId xmlns:a16="http://schemas.microsoft.com/office/drawing/2014/main" id="{24F8C86B-B6F4-4EAB-D27E-2BC5F49684F6}"/>
+                <a16:creationId xmlns:a16="http://schemas.microsoft.com/office/drawing/2014/main" id="{0ADDB668-2CA4-4D2B-9C34-3487CA330BA8}"/>
               </a:ext>
               <a:ext uri="{C183D7F6-B498-43B3-948B-1728B52AA6E4}">
                 <adec:decorative xmlns:adec="http://schemas.microsoft.com/office/drawing/2017/decorative" val="1"/>
@@ -6607,7 +6595,7 @@
           <p:cNvPr id="2" name="Título 1">
             <a:extLst>
               <a:ext uri="{FF2B5EF4-FFF2-40B4-BE49-F238E27FC236}">
-                <a16:creationId xmlns:a16="http://schemas.microsoft.com/office/drawing/2014/main" id="{470439E8-687C-1F82-FCAA-EF5F35DA5FA3}"/>
+                <a16:creationId xmlns:a16="http://schemas.microsoft.com/office/drawing/2014/main" id="{67781C07-DAE7-3E8D-0792-9B957C526C5D}"/>
               </a:ext>
             </a:extLst>
           </p:cNvPr>
@@ -6631,7 +6619,7 @@
           <a:lstStyle/>
           <a:p>
             <a:r>
-              <a:rPr lang="en-US" sz="4000" b="1" kern="1200" dirty="0">
+              <a:rPr lang="en-US" sz="4000" b="1" kern="1200">
                 <a:solidFill>
                   <a:schemeClr val="tx1"/>
                 </a:solidFill>
@@ -6639,7 +6627,7 @@
                 <a:ea typeface="+mj-ea"/>
                 <a:cs typeface="+mj-cs"/>
               </a:rPr>
-              <a:t>CUSTOS </a:t>
+              <a:t>DATAVIZ</a:t>
             </a:r>
           </a:p>
         </p:txBody>
@@ -6649,7 +6637,7 @@
           <p:cNvPr id="66" name="Rectangle 65">
             <a:extLst>
               <a:ext uri="{FF2B5EF4-FFF2-40B4-BE49-F238E27FC236}">
-                <a16:creationId xmlns:a16="http://schemas.microsoft.com/office/drawing/2014/main" id="{4475CCA1-0CF1-13AA-3AED-D83463551D0C}"/>
+                <a16:creationId xmlns:a16="http://schemas.microsoft.com/office/drawing/2014/main" id="{2568BC19-F052-4108-93E1-6A3D1DEC072F}"/>
               </a:ext>
               <a:ext uri="{C183D7F6-B498-43B3-948B-1728B52AA6E4}">
                 <adec:decorative xmlns:adec="http://schemas.microsoft.com/office/drawing/2017/decorative" val="1"/>
@@ -6717,7 +6705,7 @@
           <p:cNvPr id="68" name="Rectangle 67">
             <a:extLst>
               <a:ext uri="{FF2B5EF4-FFF2-40B4-BE49-F238E27FC236}">
-                <a16:creationId xmlns:a16="http://schemas.microsoft.com/office/drawing/2014/main" id="{E752B858-DA5C-BBD4-66DF-8EFB52DCFE96}"/>
+                <a16:creationId xmlns:a16="http://schemas.microsoft.com/office/drawing/2014/main" id="{D5FD337D-4D6B-4C8B-B6F5-121097E09881}"/>
               </a:ext>
               <a:ext uri="{C183D7F6-B498-43B3-948B-1728B52AA6E4}">
                 <adec:decorative xmlns:adec="http://schemas.microsoft.com/office/drawing/2017/decorative" val="1"/>
@@ -6783,10 +6771,10 @@
       </p:sp>
       <p:pic>
         <p:nvPicPr>
-          <p:cNvPr id="4" name="Imagem 3">
-            <a:extLst>
-              <a:ext uri="{FF2B5EF4-FFF2-40B4-BE49-F238E27FC236}">
-                <a16:creationId xmlns:a16="http://schemas.microsoft.com/office/drawing/2014/main" id="{B41D4A5F-2959-5BC1-B9D2-20524D3A1EAA}"/>
+          <p:cNvPr id="10" name="Imagem 9">
+            <a:extLst>
+              <a:ext uri="{FF2B5EF4-FFF2-40B4-BE49-F238E27FC236}">
+                <a16:creationId xmlns:a16="http://schemas.microsoft.com/office/drawing/2014/main" id="{26557A20-BBEA-4F89-F115-713428A2623E}"/>
               </a:ext>
             </a:extLst>
           </p:cNvPr>
@@ -6796,33 +6784,63 @@
           <p:nvPr/>
         </p:nvPicPr>
         <p:blipFill>
-          <a:blip r:embed="rId2">
-            <a:duotone>
-              <a:schemeClr val="accent4">
-                <a:shade val="45000"/>
-                <a:satMod val="135000"/>
-              </a:schemeClr>
-              <a:prstClr val="white"/>
-            </a:duotone>
-          </a:blip>
+          <a:blip r:embed="rId2"/>
           <a:stretch>
             <a:fillRect/>
           </a:stretch>
         </p:blipFill>
         <p:spPr>
           <a:xfrm>
-            <a:off x="740990" y="2718951"/>
-            <a:ext cx="10432647" cy="2856304"/>
+            <a:off x="1498994" y="2038052"/>
+            <a:ext cx="8856862" cy="4162585"/>
           </a:xfrm>
           <a:prstGeom prst="rect">
             <a:avLst/>
           </a:prstGeom>
         </p:spPr>
       </p:pic>
+      <p:sp>
+        <p:nvSpPr>
+          <p:cNvPr id="13" name="CaixaDeTexto 12">
+            <a:extLst>
+              <a:ext uri="{FF2B5EF4-FFF2-40B4-BE49-F238E27FC236}">
+                <a16:creationId xmlns:a16="http://schemas.microsoft.com/office/drawing/2014/main" id="{F149BD79-BC4B-044A-7343-242978A0F667}"/>
+              </a:ext>
+            </a:extLst>
+          </p:cNvPr>
+          <p:cNvSpPr txBox="1"/>
+          <p:nvPr/>
+        </p:nvSpPr>
+        <p:spPr>
+          <a:xfrm>
+            <a:off x="10444700" y="6316538"/>
+            <a:ext cx="6097836" cy="369332"/>
+          </a:xfrm>
+          <a:prstGeom prst="rect">
+            <a:avLst/>
+          </a:prstGeom>
+          <a:noFill/>
+        </p:spPr>
+        <p:txBody>
+          <a:bodyPr wrap="square">
+            <a:spAutoFit/>
+          </a:bodyPr>
+          <a:lstStyle/>
+          <a:p>
+            <a:r>
+              <a:rPr lang="pt-BR" dirty="0">
+                <a:hlinkClick r:id="rId3"/>
+              </a:rPr>
+              <a:t>SALES-TECH</a:t>
+            </a:r>
+            <a:endParaRPr lang="pt-BR" dirty="0"/>
+          </a:p>
+        </p:txBody>
+      </p:sp>
     </p:spTree>
     <p:extLst>
       <p:ext uri="{BB962C8B-B14F-4D97-AF65-F5344CB8AC3E}">
-        <p14:creationId xmlns:p14="http://schemas.microsoft.com/office/powerpoint/2010/main" val="935743452"/>
+        <p14:creationId xmlns:p14="http://schemas.microsoft.com/office/powerpoint/2010/main" val="3905939845"/>
       </p:ext>
     </p:extLst>
   </p:cSld>
@@ -8203,6 +8221,20 @@
                 </a:solidFill>
                 <a:latin typeface="-apple-system"/>
               </a:rPr>
+              <a:t>Problema:</a:t>
+            </a:r>
+          </a:p>
+          <a:p>
+            <a:pPr marL="0" indent="0">
+              <a:buNone/>
+            </a:pPr>
+            <a:r>
+              <a:rPr lang="pt-BR" dirty="0">
+                <a:solidFill>
+                  <a:srgbClr val="1F2328"/>
+                </a:solidFill>
+                <a:latin typeface="-apple-system"/>
+              </a:rPr>
               <a:t>F</a:t>
             </a:r>
             <a:r>
@@ -8240,23 +8272,10 @@
                 <a:effectLst/>
                 <a:latin typeface="-apple-system"/>
               </a:rPr>
-              <a:t>Pipeline de dados e dashboards:</a:t>
-            </a:r>
-          </a:p>
-          <a:p>
-            <a:pPr marL="0" indent="0">
-              <a:buNone/>
-            </a:pPr>
-            <a:endParaRPr lang="pt-BR" b="0" i="0" dirty="0">
-              <a:solidFill>
-                <a:srgbClr val="1F2328"/>
-              </a:solidFill>
-              <a:effectLst/>
-              <a:latin typeface="-apple-system"/>
-            </a:endParaRPr>
-          </a:p>
-          <a:p>
-            <a:pPr lvl="1"/>
+              <a:t>Solução - Pipeline de dados e dashboards:</a:t>
+            </a:r>
+          </a:p>
+          <a:p>
             <a:r>
               <a:rPr lang="pt-BR" b="0" i="0" dirty="0">
                 <a:solidFill>
@@ -8265,11 +8284,10 @@
                 <a:effectLst/>
                 <a:latin typeface="-apple-system"/>
               </a:rPr>
-              <a:t> Quais produtos estão performando melhor</a:t>
-            </a:r>
-          </a:p>
-          <a:p>
-            <a:pPr lvl="1"/>
+              <a:t> Quais produtos estão performando melhor?</a:t>
+            </a:r>
+          </a:p>
+          <a:p>
             <a:r>
               <a:rPr lang="pt-BR" dirty="0">
                 <a:solidFill>
@@ -8291,7 +8309,6 @@
             </a:r>
           </a:p>
           <a:p>
-            <a:pPr lvl="1"/>
             <a:r>
               <a:rPr lang="pt-BR" dirty="0">
                 <a:solidFill>
@@ -8309,7 +8326,7 @@
                 <a:effectLst/>
                 <a:latin typeface="-apple-system"/>
               </a:rPr>
-              <a:t>timizar estoques, e melhorar a tomada de decisões baseadas em dados concretos.</a:t>
+              <a:t>timizar estoques, e melhorar a tomada de decisões</a:t>
             </a:r>
             <a:endParaRPr lang="pt-BR" dirty="0"/>
           </a:p>
@@ -8989,10 +9006,10 @@
       </p:sp>
       <p:pic>
         <p:nvPicPr>
-          <p:cNvPr id="5" name="Imagem 4">
-            <a:extLst>
-              <a:ext uri="{FF2B5EF4-FFF2-40B4-BE49-F238E27FC236}">
-                <a16:creationId xmlns:a16="http://schemas.microsoft.com/office/drawing/2014/main" id="{B35FA7AB-24C3-4CD2-8221-7A93394BBD11}"/>
+          <p:cNvPr id="6" name="Imagem 5" descr="Diagrama&#10;&#10;Descrição gerada automaticamente">
+            <a:extLst>
+              <a:ext uri="{FF2B5EF4-FFF2-40B4-BE49-F238E27FC236}">
+                <a16:creationId xmlns:a16="http://schemas.microsoft.com/office/drawing/2014/main" id="{E7700CA5-1FF9-227E-B4F4-750C5B9E14E4}"/>
               </a:ext>
             </a:extLst>
           </p:cNvPr>
@@ -9002,21 +9019,81 @@
           <p:nvPr/>
         </p:nvPicPr>
         <p:blipFill>
-          <a:blip r:embed="rId2"/>
+          <a:blip r:embed="rId2">
+            <a:extLst>
+              <a:ext uri="{28A0092B-C50C-407E-A947-70E740481C1C}">
+                <a14:useLocalDpi xmlns:a14="http://schemas.microsoft.com/office/drawing/2010/main" val="0"/>
+              </a:ext>
+            </a:extLst>
+          </a:blip>
           <a:stretch>
             <a:fillRect/>
           </a:stretch>
         </p:blipFill>
         <p:spPr>
           <a:xfrm>
-            <a:off x="385572" y="2174815"/>
-            <a:ext cx="11420856" cy="4025850"/>
+            <a:off x="711586" y="2349459"/>
+            <a:ext cx="10768828" cy="3713389"/>
           </a:xfrm>
           <a:prstGeom prst="rect">
             <a:avLst/>
           </a:prstGeom>
         </p:spPr>
       </p:pic>
+      <p:sp>
+        <p:nvSpPr>
+          <p:cNvPr id="3" name="Retângulo 2">
+            <a:extLst>
+              <a:ext uri="{FF2B5EF4-FFF2-40B4-BE49-F238E27FC236}">
+                <a16:creationId xmlns:a16="http://schemas.microsoft.com/office/drawing/2014/main" id="{0B858A44-4803-5B3E-D98F-0BEA9DC48CEB}"/>
+              </a:ext>
+            </a:extLst>
+          </p:cNvPr>
+          <p:cNvSpPr/>
+          <p:nvPr/>
+        </p:nvSpPr>
+        <p:spPr>
+          <a:xfrm>
+            <a:off x="4757057" y="2841171"/>
+            <a:ext cx="3320143" cy="1524000"/>
+          </a:xfrm>
+          <a:prstGeom prst="rect">
+            <a:avLst/>
+          </a:prstGeom>
+          <a:noFill/>
+          <a:ln w="76200" cap="flat" cmpd="sng" algn="ctr">
+            <a:solidFill>
+              <a:schemeClr val="accent2"/>
+            </a:solidFill>
+            <a:prstDash val="solid"/>
+            <a:round/>
+            <a:headEnd type="none" w="med" len="med"/>
+            <a:tailEnd type="none" w="med" len="med"/>
+          </a:ln>
+        </p:spPr>
+        <p:style>
+          <a:lnRef idx="0">
+            <a:scrgbClr r="0" g="0" b="0"/>
+          </a:lnRef>
+          <a:fillRef idx="0">
+            <a:scrgbClr r="0" g="0" b="0"/>
+          </a:fillRef>
+          <a:effectRef idx="0">
+            <a:scrgbClr r="0" g="0" b="0"/>
+          </a:effectRef>
+          <a:fontRef idx="minor">
+            <a:schemeClr val="accent2"/>
+          </a:fontRef>
+        </p:style>
+        <p:txBody>
+          <a:bodyPr rtlCol="0" anchor="ctr"/>
+          <a:lstStyle/>
+          <a:p>
+            <a:pPr algn="ctr"/>
+            <a:endParaRPr lang="pt-BR"/>
+          </a:p>
+        </p:txBody>
+      </p:sp>
     </p:spTree>
     <p:extLst>
       <p:ext uri="{BB962C8B-B14F-4D97-AF65-F5344CB8AC3E}">

</xml_diff>